<commit_message>
Some changes in the documentation
</commit_message>
<xml_diff>
--- a/DistributedMessageBroker.pptx
+++ b/DistributedMessageBroker.pptx
@@ -14,10 +14,10 @@
     <p:sldId id="262" r:id="rId8"/>
     <p:sldId id="269" r:id="rId9"/>
     <p:sldId id="263" r:id="rId10"/>
-    <p:sldId id="264" r:id="rId11"/>
-    <p:sldId id="265" r:id="rId12"/>
-    <p:sldId id="266" r:id="rId13"/>
-    <p:sldId id="267" r:id="rId14"/>
+    <p:sldId id="266" r:id="rId11"/>
+    <p:sldId id="272" r:id="rId12"/>
+    <p:sldId id="273" r:id="rId13"/>
+    <p:sldId id="274" r:id="rId14"/>
     <p:sldId id="268" r:id="rId15"/>
     <p:sldId id="270" r:id="rId16"/>
     <p:sldId id="271" r:id="rId17"/>
@@ -339,7 +339,7 @@
           <a:p>
             <a:fld id="{9A9AFB1C-FB1C-4499-A837-3BBF55735069}" type="slidenum">
               <a:rPr lang="en-US" smtClean="0"/>
-              <a:t>‹#›</a:t>
+              <a:t>‹N›</a:t>
             </a:fld>
             <a:endParaRPr lang="en-US"/>
           </a:p>
@@ -537,7 +537,7 @@
           <a:p>
             <a:fld id="{9A9AFB1C-FB1C-4499-A837-3BBF55735069}" type="slidenum">
               <a:rPr lang="en-US" smtClean="0"/>
-              <a:t>‹#›</a:t>
+              <a:t>‹N›</a:t>
             </a:fld>
             <a:endParaRPr lang="en-US"/>
           </a:p>
@@ -745,7 +745,7 @@
           <a:p>
             <a:fld id="{9A9AFB1C-FB1C-4499-A837-3BBF55735069}" type="slidenum">
               <a:rPr lang="en-US" smtClean="0"/>
-              <a:t>‹#›</a:t>
+              <a:t>‹N›</a:t>
             </a:fld>
             <a:endParaRPr lang="en-US"/>
           </a:p>
@@ -943,7 +943,7 @@
           <a:p>
             <a:fld id="{9A9AFB1C-FB1C-4499-A837-3BBF55735069}" type="slidenum">
               <a:rPr lang="en-US" smtClean="0"/>
-              <a:t>‹#›</a:t>
+              <a:t>‹N›</a:t>
             </a:fld>
             <a:endParaRPr lang="en-US"/>
           </a:p>
@@ -1223,7 +1223,7 @@
           <a:p>
             <a:fld id="{9A9AFB1C-FB1C-4499-A837-3BBF55735069}" type="slidenum">
               <a:rPr lang="en-US" smtClean="0"/>
-              <a:t>‹#›</a:t>
+              <a:t>‹N›</a:t>
             </a:fld>
             <a:endParaRPr lang="en-US"/>
           </a:p>
@@ -1488,7 +1488,7 @@
           <a:p>
             <a:fld id="{9A9AFB1C-FB1C-4499-A837-3BBF55735069}" type="slidenum">
               <a:rPr lang="en-US" smtClean="0"/>
-              <a:t>‹#›</a:t>
+              <a:t>‹N›</a:t>
             </a:fld>
             <a:endParaRPr lang="en-US"/>
           </a:p>
@@ -1867,7 +1867,7 @@
           <a:p>
             <a:fld id="{9A9AFB1C-FB1C-4499-A837-3BBF55735069}" type="slidenum">
               <a:rPr lang="en-US" smtClean="0"/>
-              <a:t>‹#›</a:t>
+              <a:t>‹N›</a:t>
             </a:fld>
             <a:endParaRPr lang="en-US"/>
           </a:p>
@@ -2036,7 +2036,7 @@
           <a:p>
             <a:fld id="{9A9AFB1C-FB1C-4499-A837-3BBF55735069}" type="slidenum">
               <a:rPr lang="en-US" smtClean="0"/>
-              <a:t>‹#›</a:t>
+              <a:t>‹N›</a:t>
             </a:fld>
             <a:endParaRPr lang="en-US"/>
           </a:p>
@@ -2149,7 +2149,7 @@
           <a:p>
             <a:fld id="{9A9AFB1C-FB1C-4499-A837-3BBF55735069}" type="slidenum">
               <a:rPr lang="en-US" smtClean="0"/>
-              <a:t>‹#›</a:t>
+              <a:t>‹N›</a:t>
             </a:fld>
             <a:endParaRPr lang="en-US"/>
           </a:p>
@@ -2465,7 +2465,7 @@
           <a:p>
             <a:fld id="{9A9AFB1C-FB1C-4499-A837-3BBF55735069}" type="slidenum">
               <a:rPr lang="en-US" smtClean="0"/>
-              <a:t>‹#›</a:t>
+              <a:t>‹N›</a:t>
             </a:fld>
             <a:endParaRPr lang="en-US"/>
           </a:p>
@@ -2756,7 +2756,7 @@
           <a:p>
             <a:fld id="{9A9AFB1C-FB1C-4499-A837-3BBF55735069}" type="slidenum">
               <a:rPr lang="en-US" smtClean="0"/>
-              <a:t>‹#›</a:t>
+              <a:t>‹N›</a:t>
             </a:fld>
             <a:endParaRPr lang="en-US"/>
           </a:p>
@@ -3156,7 +3156,7 @@
           <a:p>
             <a:fld id="{9A9AFB1C-FB1C-4499-A837-3BBF55735069}" type="slidenum">
               <a:rPr lang="en-US" smtClean="0"/>
-              <a:t>‹#›</a:t>
+              <a:t>‹N›</a:t>
             </a:fld>
             <a:endParaRPr lang="en-US"/>
           </a:p>
@@ -4459,7 +4459,7 @@
           <p:cNvPr id="2" name="Title 1">
             <a:extLst>
               <a:ext uri="{FF2B5EF4-FFF2-40B4-BE49-F238E27FC236}">
-                <a16:creationId xmlns:a16="http://schemas.microsoft.com/office/drawing/2014/main" id="{AA3A2F1C-EF5E-4E4D-9A81-01B3388A723D}"/>
+                <a16:creationId xmlns:a16="http://schemas.microsoft.com/office/drawing/2014/main" id="{AF2B36B0-C27D-4883-A4B4-88CC1408F696}"/>
               </a:ext>
             </a:extLst>
           </p:cNvPr>
@@ -4477,7 +4477,7 @@
           <a:p>
             <a:r>
               <a:rPr lang="en-US" dirty="0"/>
-              <a:t>Test plan (2)</a:t>
+              <a:t>Testing objectives</a:t>
             </a:r>
           </a:p>
         </p:txBody>
@@ -4487,7 +4487,7 @@
           <p:cNvPr id="3" name="Content Placeholder 2">
             <a:extLst>
               <a:ext uri="{FF2B5EF4-FFF2-40B4-BE49-F238E27FC236}">
-                <a16:creationId xmlns:a16="http://schemas.microsoft.com/office/drawing/2014/main" id="{7FD0306E-2F38-4D7C-9F0B-A5F2F933716E}"/>
+                <a16:creationId xmlns:a16="http://schemas.microsoft.com/office/drawing/2014/main" id="{0C57BF84-04C5-4ADE-8ED0-8DF9215FE8F2}"/>
               </a:ext>
             </a:extLst>
           </p:cNvPr>
@@ -4498,29 +4498,86 @@
             <p:ph idx="1"/>
           </p:nvPr>
         </p:nvSpPr>
-        <p:spPr/>
+        <p:spPr>
+          <a:xfrm>
+            <a:off x="975360" y="2103120"/>
+            <a:ext cx="10241280" cy="3959352"/>
+          </a:xfrm>
+        </p:spPr>
         <p:txBody>
           <a:bodyPr/>
           <a:lstStyle/>
           <a:p>
-            <a:pPr marL="457200" indent="-457200">
-              <a:buFont typeface="+mj-lt"/>
-              <a:buAutoNum type="arabicPeriod" startAt="2"/>
+            <a:pPr marL="0" indent="0">
+              <a:buNone/>
             </a:pPr>
+            <a:endParaRPr lang="en-US" dirty="0"/>
+          </a:p>
+          <a:p>
+            <a:pPr lvl="1"/>
             <a:r>
               <a:rPr lang="en-US" dirty="0"/>
-              <a:t>Then you can execute the </a:t>
-            </a:r>
-            <a:r>
-              <a:rPr lang="en-US" i="1" dirty="0"/>
-              <a:t>configuration/subscribe_resource.py </a:t>
-            </a:r>
+              <a:t>All the subscribers to a resource receive the messages published on it</a:t>
+            </a:r>
+          </a:p>
+          <a:p>
+            <a:pPr lvl="1"/>
             <a:r>
               <a:rPr lang="en-US" dirty="0"/>
-              <a:t>that allow you to subscribe to some resources to do tests. </a:t>
-            </a:r>
-          </a:p>
-          <a:p>
+              <a:t>Non-subscribers do not see message published on the resource</a:t>
+            </a:r>
+          </a:p>
+          <a:p>
+            <a:pPr lvl="1"/>
+            <a:r>
+              <a:rPr lang="en-US" dirty="0"/>
+              <a:t>A host can subscribe to multiple resources</a:t>
+            </a:r>
+          </a:p>
+          <a:p>
+            <a:pPr lvl="1"/>
+            <a:r>
+              <a:rPr lang="en-US" dirty="0"/>
+              <a:t>A host that unsubscribes no longer receives messages published to that resource</a:t>
+            </a:r>
+          </a:p>
+          <a:p>
+            <a:pPr lvl="1"/>
+            <a:r>
+              <a:rPr lang="en-US" dirty="0"/>
+              <a:t>When a resource is deleted, no host is subscriber anymore and receives nothing</a:t>
+            </a:r>
+          </a:p>
+          <a:p>
+            <a:pPr lvl="1"/>
+            <a:r>
+              <a:rPr lang="en-US" dirty="0"/>
+              <a:t>A host can not send a message to another host directly</a:t>
+            </a:r>
+          </a:p>
+          <a:p>
+            <a:pPr lvl="1"/>
+            <a:r>
+              <a:rPr lang="en-US" dirty="0"/>
+              <a:t>A host cannot publish to a resource to which it is subscribed</a:t>
+            </a:r>
+          </a:p>
+          <a:p>
+            <a:pPr marL="457200" lvl="1" indent="0">
+              <a:buNone/>
+            </a:pPr>
+            <a:endParaRPr lang="en-US" dirty="0"/>
+          </a:p>
+          <a:p>
+            <a:pPr marL="457200" lvl="1" indent="0">
+              <a:buNone/>
+            </a:pPr>
+            <a:endParaRPr lang="en-US" dirty="0"/>
+          </a:p>
+          <a:p>
+            <a:pPr marL="457200" lvl="1" indent="0">
+              <a:buNone/>
+            </a:pPr>
             <a:endParaRPr lang="en-US" dirty="0"/>
           </a:p>
         </p:txBody>
@@ -4528,7 +4585,7 @@
     </p:spTree>
     <p:extLst>
       <p:ext uri="{BB962C8B-B14F-4D97-AF65-F5344CB8AC3E}">
-        <p14:creationId xmlns:p14="http://schemas.microsoft.com/office/powerpoint/2010/main" val="3813205288"/>
+        <p14:creationId xmlns:p14="http://schemas.microsoft.com/office/powerpoint/2010/main" val="2786639440"/>
       </p:ext>
     </p:extLst>
   </p:cSld>
@@ -4557,332 +4614,19 @@
       </p:grpSpPr>
       <p:sp>
         <p:nvSpPr>
-          <p:cNvPr id="2" name="Title 1">
-            <a:extLst>
-              <a:ext uri="{FF2B5EF4-FFF2-40B4-BE49-F238E27FC236}">
-                <a16:creationId xmlns:a16="http://schemas.microsoft.com/office/drawing/2014/main" id="{AE1BE912-5D79-4E89-BBAC-5D1FB35F6E0C}"/>
-              </a:ext>
-            </a:extLst>
-          </p:cNvPr>
-          <p:cNvSpPr>
-            <a:spLocks noGrp="1"/>
-          </p:cNvSpPr>
-          <p:nvPr>
-            <p:ph type="title"/>
-          </p:nvPr>
-        </p:nvSpPr>
-        <p:spPr/>
-        <p:txBody>
-          <a:bodyPr/>
-          <a:lstStyle/>
-          <a:p>
-            <a:r>
-              <a:rPr lang="en-US" dirty="0"/>
-              <a:t>Test plan (3)</a:t>
-            </a:r>
-          </a:p>
-        </p:txBody>
-      </p:sp>
-      <p:sp>
-        <p:nvSpPr>
-          <p:cNvPr id="3" name="Content Placeholder 2">
-            <a:extLst>
-              <a:ext uri="{FF2B5EF4-FFF2-40B4-BE49-F238E27FC236}">
-                <a16:creationId xmlns:a16="http://schemas.microsoft.com/office/drawing/2014/main" id="{E4E649E3-9481-4F2C-BD2B-2870D56E49DE}"/>
-              </a:ext>
-            </a:extLst>
-          </p:cNvPr>
-          <p:cNvSpPr>
-            <a:spLocks noGrp="1"/>
-          </p:cNvSpPr>
-          <p:nvPr>
-            <p:ph idx="1"/>
-          </p:nvPr>
-        </p:nvSpPr>
-        <p:spPr/>
-        <p:txBody>
-          <a:bodyPr/>
-          <a:lstStyle/>
-          <a:p>
-            <a:pPr marL="457200" indent="-457200">
-              <a:buFont typeface="+mj-lt"/>
-              <a:buAutoNum type="arabicPeriod" startAt="3"/>
-            </a:pPr>
-            <a:r>
-              <a:rPr lang="en-US" dirty="0"/>
-              <a:t>Now you can run the </a:t>
-            </a:r>
-            <a:r>
-              <a:rPr lang="en-US" i="1" dirty="0"/>
-              <a:t>topology/topology.py</a:t>
-            </a:r>
-            <a:r>
-              <a:rPr lang="en-US" dirty="0"/>
-              <a:t> to replicate the test topology on </a:t>
-            </a:r>
-            <a:r>
-              <a:rPr lang="en-US" dirty="0" err="1"/>
-              <a:t>mininet</a:t>
-            </a:r>
-            <a:r>
-              <a:rPr lang="en-US" dirty="0"/>
-              <a:t>.</a:t>
-            </a:r>
-          </a:p>
-        </p:txBody>
-      </p:sp>
-    </p:spTree>
-    <p:extLst>
-      <p:ext uri="{BB962C8B-B14F-4D97-AF65-F5344CB8AC3E}">
-        <p14:creationId xmlns:p14="http://schemas.microsoft.com/office/powerpoint/2010/main" val="3486120311"/>
-      </p:ext>
-    </p:extLst>
-  </p:cSld>
-  <p:clrMapOvr>
-    <a:masterClrMapping/>
-  </p:clrMapOvr>
-</p:sld>
-</file>
-
-<file path=ppt/slides/slide12.xml><?xml version="1.0" encoding="utf-8"?>
-<p:sld xmlns:a="http://schemas.openxmlformats.org/drawingml/2006/main" xmlns:r="http://schemas.openxmlformats.org/officeDocument/2006/relationships" xmlns:p="http://schemas.openxmlformats.org/presentationml/2006/main">
-  <p:cSld>
-    <p:spTree>
-      <p:nvGrpSpPr>
-        <p:cNvPr id="1" name=""/>
-        <p:cNvGrpSpPr/>
-        <p:nvPr/>
-      </p:nvGrpSpPr>
-      <p:grpSpPr>
-        <a:xfrm>
-          <a:off x="0" y="0"/>
-          <a:ext cx="0" cy="0"/>
-          <a:chOff x="0" y="0"/>
-          <a:chExt cx="0" cy="0"/>
-        </a:xfrm>
-      </p:grpSpPr>
-      <p:sp>
-        <p:nvSpPr>
-          <p:cNvPr id="2" name="Title 1">
-            <a:extLst>
-              <a:ext uri="{FF2B5EF4-FFF2-40B4-BE49-F238E27FC236}">
-                <a16:creationId xmlns:a16="http://schemas.microsoft.com/office/drawing/2014/main" id="{AF2B36B0-C27D-4883-A4B4-88CC1408F696}"/>
-              </a:ext>
-            </a:extLst>
-          </p:cNvPr>
-          <p:cNvSpPr>
-            <a:spLocks noGrp="1"/>
-          </p:cNvSpPr>
-          <p:nvPr>
-            <p:ph type="title"/>
-          </p:nvPr>
-        </p:nvSpPr>
-        <p:spPr/>
-        <p:txBody>
-          <a:bodyPr/>
-          <a:lstStyle/>
-          <a:p>
-            <a:r>
-              <a:rPr lang="en-US" dirty="0"/>
-              <a:t>Test plan  (4)</a:t>
-            </a:r>
-          </a:p>
-        </p:txBody>
-      </p:sp>
-      <p:sp>
-        <p:nvSpPr>
-          <p:cNvPr id="3" name="Content Placeholder 2">
-            <a:extLst>
-              <a:ext uri="{FF2B5EF4-FFF2-40B4-BE49-F238E27FC236}">
-                <a16:creationId xmlns:a16="http://schemas.microsoft.com/office/drawing/2014/main" id="{0C57BF84-04C5-4ADE-8ED0-8DF9215FE8F2}"/>
-              </a:ext>
-            </a:extLst>
-          </p:cNvPr>
-          <p:cNvSpPr>
-            <a:spLocks noGrp="1"/>
-          </p:cNvSpPr>
-          <p:nvPr>
-            <p:ph idx="1"/>
-          </p:nvPr>
-        </p:nvSpPr>
-        <p:spPr/>
-        <p:txBody>
-          <a:bodyPr/>
-          <a:lstStyle/>
-          <a:p>
-            <a:pPr marL="457200" indent="-457200">
-              <a:buFont typeface="+mj-lt"/>
-              <a:buAutoNum type="arabicPeriod" startAt="4"/>
-            </a:pPr>
-            <a:r>
-              <a:rPr lang="en-US" dirty="0"/>
-              <a:t>Perform some publish on resources to show that:</a:t>
-            </a:r>
-          </a:p>
-          <a:p>
-            <a:pPr lvl="1"/>
-            <a:r>
-              <a:rPr lang="en-US" dirty="0"/>
-              <a:t>Non-subscribers do not see message published on the resource</a:t>
-            </a:r>
-          </a:p>
-          <a:p>
-            <a:pPr lvl="1"/>
-            <a:r>
-              <a:rPr lang="en-US" dirty="0"/>
-              <a:t>A host can subscribe to multiple resources</a:t>
-            </a:r>
-          </a:p>
-          <a:p>
-            <a:pPr lvl="1"/>
-            <a:r>
-              <a:rPr lang="en-US" dirty="0"/>
-              <a:t>A host can not send a message to another host directly</a:t>
-            </a:r>
-          </a:p>
-          <a:p>
-            <a:pPr lvl="1"/>
-            <a:endParaRPr lang="en-US" dirty="0"/>
-          </a:p>
-          <a:p>
-            <a:pPr marL="457200" lvl="1" indent="0">
-              <a:buNone/>
-            </a:pPr>
-            <a:endParaRPr lang="en-US" dirty="0"/>
-          </a:p>
-          <a:p>
-            <a:pPr marL="457200" lvl="1" indent="0">
-              <a:buNone/>
-            </a:pPr>
-            <a:endParaRPr lang="en-US" dirty="0"/>
-          </a:p>
-        </p:txBody>
-      </p:sp>
-    </p:spTree>
-    <p:extLst>
-      <p:ext uri="{BB962C8B-B14F-4D97-AF65-F5344CB8AC3E}">
-        <p14:creationId xmlns:p14="http://schemas.microsoft.com/office/powerpoint/2010/main" val="2786639440"/>
-      </p:ext>
-    </p:extLst>
-  </p:cSld>
-  <p:clrMapOvr>
-    <a:masterClrMapping/>
-  </p:clrMapOvr>
-</p:sld>
-</file>
-
-<file path=ppt/slides/slide13.xml><?xml version="1.0" encoding="utf-8"?>
-<p:sld xmlns:a="http://schemas.openxmlformats.org/drawingml/2006/main" xmlns:r="http://schemas.openxmlformats.org/officeDocument/2006/relationships" xmlns:p="http://schemas.openxmlformats.org/presentationml/2006/main">
-  <p:cSld>
-    <p:spTree>
-      <p:nvGrpSpPr>
-        <p:cNvPr id="1" name=""/>
-        <p:cNvGrpSpPr/>
-        <p:nvPr/>
-      </p:nvGrpSpPr>
-      <p:grpSpPr>
-        <a:xfrm>
-          <a:off x="0" y="0"/>
-          <a:ext cx="0" cy="0"/>
-          <a:chOff x="0" y="0"/>
-          <a:chExt cx="0" cy="0"/>
-        </a:xfrm>
-      </p:grpSpPr>
-      <p:sp>
-        <p:nvSpPr>
-          <p:cNvPr id="2" name="Title 1">
-            <a:extLst>
-              <a:ext uri="{FF2B5EF4-FFF2-40B4-BE49-F238E27FC236}">
-                <a16:creationId xmlns:a16="http://schemas.microsoft.com/office/drawing/2014/main" id="{D8F26826-E894-4A54-BF9B-944259CFAD5D}"/>
-              </a:ext>
-            </a:extLst>
-          </p:cNvPr>
-          <p:cNvSpPr>
-            <a:spLocks noGrp="1"/>
-          </p:cNvSpPr>
-          <p:nvPr>
-            <p:ph type="title"/>
-          </p:nvPr>
-        </p:nvSpPr>
-        <p:spPr/>
-        <p:txBody>
-          <a:bodyPr/>
-          <a:lstStyle/>
-          <a:p>
-            <a:r>
-              <a:rPr lang="en-US" dirty="0"/>
-              <a:t>Test plan (5)</a:t>
-            </a:r>
-          </a:p>
-        </p:txBody>
-      </p:sp>
-      <p:sp>
-        <p:nvSpPr>
-          <p:cNvPr id="3" name="Content Placeholder 2">
-            <a:extLst>
-              <a:ext uri="{FF2B5EF4-FFF2-40B4-BE49-F238E27FC236}">
-                <a16:creationId xmlns:a16="http://schemas.microsoft.com/office/drawing/2014/main" id="{3D7A0256-334E-40A6-9F24-ABDF2E5714CE}"/>
-              </a:ext>
-            </a:extLst>
-          </p:cNvPr>
-          <p:cNvSpPr>
-            <a:spLocks noGrp="1"/>
-          </p:cNvSpPr>
-          <p:nvPr>
-            <p:ph idx="1"/>
-          </p:nvPr>
+          <p:cNvPr id="6" name="Rectangle 3">
+            <a:extLst>
+              <a:ext uri="{FF2B5EF4-FFF2-40B4-BE49-F238E27FC236}">
+                <a16:creationId xmlns:a16="http://schemas.microsoft.com/office/drawing/2014/main" id="{9E6E9C82-EC4B-43A6-A978-EB539813077E}"/>
+              </a:ext>
+            </a:extLst>
+          </p:cNvPr>
+          <p:cNvSpPr/>
+          <p:nvPr/>
         </p:nvSpPr>
         <p:spPr>
           <a:xfrm>
-            <a:off x="1371600" y="2112264"/>
-            <a:ext cx="10241280" cy="1234440"/>
-          </a:xfrm>
-        </p:spPr>
-        <p:txBody>
-          <a:bodyPr/>
-          <a:lstStyle/>
-          <a:p>
-            <a:pPr marL="0" indent="0">
-              <a:buNone/>
-            </a:pPr>
-            <a:r>
-              <a:rPr lang="en-US" dirty="0"/>
-              <a:t>After running the </a:t>
-            </a:r>
-            <a:r>
-              <a:rPr lang="en-US" i="1" dirty="0"/>
-              <a:t>publisher-subscriber/subscriber.py</a:t>
-            </a:r>
-            <a:r>
-              <a:rPr lang="en-US" dirty="0"/>
-              <a:t> on host h1, h2, h3, h4 run the </a:t>
-            </a:r>
-            <a:r>
-              <a:rPr lang="en-US" i="1" dirty="0"/>
-              <a:t>publisher-subscriber/publisher.py </a:t>
-            </a:r>
-            <a:r>
-              <a:rPr lang="en-US" dirty="0"/>
-              <a:t>on host h5 and h7.</a:t>
-            </a:r>
-          </a:p>
-        </p:txBody>
-      </p:sp>
-      <p:sp>
-        <p:nvSpPr>
-          <p:cNvPr id="4" name="Rectangle 3">
-            <a:extLst>
-              <a:ext uri="{FF2B5EF4-FFF2-40B4-BE49-F238E27FC236}">
-                <a16:creationId xmlns:a16="http://schemas.microsoft.com/office/drawing/2014/main" id="{AB59B07C-46EB-42B1-B76E-2347480DF685}"/>
-              </a:ext>
-            </a:extLst>
-          </p:cNvPr>
-          <p:cNvSpPr/>
-          <p:nvPr/>
-        </p:nvSpPr>
-        <p:spPr>
-          <a:xfrm>
-            <a:off x="3813941" y="3507829"/>
+            <a:off x="7235581" y="3100673"/>
             <a:ext cx="4564117" cy="1749972"/>
           </a:xfrm>
           <a:prstGeom prst="rect">
@@ -4922,10 +4666,202 @@
       </p:sp>
       <p:sp>
         <p:nvSpPr>
-          <p:cNvPr id="5" name="TextBox 4">
-            <a:extLst>
-              <a:ext uri="{FF2B5EF4-FFF2-40B4-BE49-F238E27FC236}">
-                <a16:creationId xmlns:a16="http://schemas.microsoft.com/office/drawing/2014/main" id="{D5D64801-550B-40FE-8304-36D2E7D0E5D7}"/>
+          <p:cNvPr id="2" name="Titolo 1">
+            <a:extLst>
+              <a:ext uri="{FF2B5EF4-FFF2-40B4-BE49-F238E27FC236}">
+                <a16:creationId xmlns:a16="http://schemas.microsoft.com/office/drawing/2014/main" id="{F698847E-2031-4622-8F09-E5A2DBA199AB}"/>
+              </a:ext>
+            </a:extLst>
+          </p:cNvPr>
+          <p:cNvSpPr>
+            <a:spLocks noGrp="1"/>
+          </p:cNvSpPr>
+          <p:nvPr>
+            <p:ph type="title"/>
+          </p:nvPr>
+        </p:nvSpPr>
+        <p:spPr/>
+        <p:txBody>
+          <a:bodyPr/>
+          <a:lstStyle/>
+          <a:p>
+            <a:r>
+              <a:rPr lang="it-IT" dirty="0" err="1"/>
+              <a:t>Publish</a:t>
+            </a:r>
+            <a:r>
+              <a:rPr lang="it-IT" dirty="0"/>
+              <a:t> a </a:t>
+            </a:r>
+            <a:r>
+              <a:rPr lang="it-IT" dirty="0" err="1"/>
+              <a:t>udp</a:t>
+            </a:r>
+            <a:r>
+              <a:rPr lang="it-IT" dirty="0"/>
+              <a:t> </a:t>
+            </a:r>
+            <a:r>
+              <a:rPr lang="it-IT" dirty="0" err="1"/>
+              <a:t>message</a:t>
+            </a:r>
+            <a:r>
+              <a:rPr lang="it-IT" dirty="0"/>
+              <a:t> (1)</a:t>
+            </a:r>
+            <a:endParaRPr lang="en-US" dirty="0"/>
+          </a:p>
+        </p:txBody>
+      </p:sp>
+      <p:sp>
+        <p:nvSpPr>
+          <p:cNvPr id="3" name="Segnaposto contenuto 2">
+            <a:extLst>
+              <a:ext uri="{FF2B5EF4-FFF2-40B4-BE49-F238E27FC236}">
+                <a16:creationId xmlns:a16="http://schemas.microsoft.com/office/drawing/2014/main" id="{F0DC22E6-840E-4BB1-87BA-726B7A19800E}"/>
+              </a:ext>
+            </a:extLst>
+          </p:cNvPr>
+          <p:cNvSpPr>
+            <a:spLocks noGrp="1"/>
+          </p:cNvSpPr>
+          <p:nvPr>
+            <p:ph idx="1"/>
+          </p:nvPr>
+        </p:nvSpPr>
+        <p:spPr>
+          <a:xfrm>
+            <a:off x="1025332" y="2313806"/>
+            <a:ext cx="5497807" cy="3959352"/>
+          </a:xfrm>
+        </p:spPr>
+        <p:txBody>
+          <a:bodyPr/>
+          <a:lstStyle/>
+          <a:p>
+            <a:endParaRPr lang="en-US" b="0" i="0" dirty="0">
+              <a:effectLst/>
+              <a:latin typeface="Arial" panose="020B0604020202020204" pitchFamily="34" charset="0"/>
+            </a:endParaRPr>
+          </a:p>
+          <a:p>
+            <a:endParaRPr lang="en-US" dirty="0">
+              <a:latin typeface="Arial" panose="020B0604020202020204" pitchFamily="34" charset="0"/>
+            </a:endParaRPr>
+          </a:p>
+          <a:p>
+            <a:pPr lvl="1"/>
+            <a:r>
+              <a:rPr lang="en-US" b="0" i="0" dirty="0">
+                <a:effectLst/>
+                <a:latin typeface="Arial" panose="020B0604020202020204" pitchFamily="34" charset="0"/>
+              </a:rPr>
+              <a:t>Publish an UDP message to a resource </a:t>
+            </a:r>
+          </a:p>
+          <a:p>
+            <a:pPr lvl="2"/>
+            <a:r>
+              <a:rPr lang="en-US" b="0" i="0" dirty="0">
+                <a:effectLst/>
+                <a:latin typeface="Arial" panose="020B0604020202020204" pitchFamily="34" charset="0"/>
+              </a:rPr>
+              <a:t>Hosts attached to the same switch</a:t>
+            </a:r>
+          </a:p>
+          <a:p>
+            <a:pPr lvl="2"/>
+            <a:r>
+              <a:rPr lang="en-US" b="0" i="0" dirty="0">
+                <a:effectLst/>
+                <a:latin typeface="Arial" panose="020B0604020202020204" pitchFamily="34" charset="0"/>
+              </a:rPr>
+              <a:t>Hosts 2 hops away</a:t>
+            </a:r>
+          </a:p>
+          <a:p>
+            <a:pPr lvl="2"/>
+            <a:r>
+              <a:rPr lang="en-US" dirty="0">
+                <a:latin typeface="Arial" panose="020B0604020202020204" pitchFamily="34" charset="0"/>
+              </a:rPr>
+              <a:t>Hosts 3 hops away </a:t>
+            </a:r>
+          </a:p>
+          <a:p>
+            <a:pPr lvl="1"/>
+            <a:endParaRPr lang="en-US" dirty="0">
+              <a:latin typeface="Arial" panose="020B0604020202020204" pitchFamily="34" charset="0"/>
+            </a:endParaRPr>
+          </a:p>
+          <a:p>
+            <a:pPr marL="457200" lvl="1" indent="0">
+              <a:buNone/>
+            </a:pPr>
+            <a:endParaRPr lang="en-US" dirty="0">
+              <a:latin typeface="Arial" panose="020B0604020202020204" pitchFamily="34" charset="0"/>
+            </a:endParaRPr>
+          </a:p>
+        </p:txBody>
+      </p:sp>
+      <p:sp>
+        <p:nvSpPr>
+          <p:cNvPr id="4" name="Rectangle 3">
+            <a:extLst>
+              <a:ext uri="{FF2B5EF4-FFF2-40B4-BE49-F238E27FC236}">
+                <a16:creationId xmlns:a16="http://schemas.microsoft.com/office/drawing/2014/main" id="{EE2E31E1-400E-487D-8492-3FEB17F1EA26}"/>
+              </a:ext>
+            </a:extLst>
+          </p:cNvPr>
+          <p:cNvSpPr/>
+          <p:nvPr/>
+        </p:nvSpPr>
+        <p:spPr>
+          <a:xfrm>
+            <a:off x="4503892" y="4327033"/>
+            <a:ext cx="4564117" cy="1749972"/>
+          </a:xfrm>
+          <a:prstGeom prst="rect">
+            <a:avLst/>
+          </a:prstGeom>
+          <a:noFill/>
+          <a:effectLst>
+            <a:outerShdw blurRad="50800" dist="38100" dir="5400000" algn="t" rotWithShape="0">
+              <a:prstClr val="black">
+                <a:alpha val="40000"/>
+              </a:prstClr>
+            </a:outerShdw>
+          </a:effectLst>
+        </p:spPr>
+        <p:style>
+          <a:lnRef idx="2">
+            <a:schemeClr val="accent6"/>
+          </a:lnRef>
+          <a:fillRef idx="1">
+            <a:schemeClr val="lt1"/>
+          </a:fillRef>
+          <a:effectRef idx="0">
+            <a:schemeClr val="accent6"/>
+          </a:effectRef>
+          <a:fontRef idx="minor">
+            <a:schemeClr val="dk1"/>
+          </a:fontRef>
+        </p:style>
+        <p:txBody>
+          <a:bodyPr rtlCol="0" anchor="ctr"/>
+          <a:lstStyle/>
+          <a:p>
+            <a:pPr algn="ctr"/>
+            <a:endParaRPr lang="en-US"/>
+          </a:p>
+        </p:txBody>
+      </p:sp>
+      <p:sp>
+        <p:nvSpPr>
+          <p:cNvPr id="8" name="TextBox 4">
+            <a:extLst>
+              <a:ext uri="{FF2B5EF4-FFF2-40B4-BE49-F238E27FC236}">
+                <a16:creationId xmlns:a16="http://schemas.microsoft.com/office/drawing/2014/main" id="{F08CECD1-4FE0-4025-A264-49BADCBF1EDC}"/>
               </a:ext>
             </a:extLst>
           </p:cNvPr>
@@ -4934,8 +4870,8 @@
         </p:nvSpPr>
         <p:spPr>
           <a:xfrm>
-            <a:off x="3813941" y="3507829"/>
-            <a:ext cx="4564118" cy="2031325"/>
+            <a:off x="7360869" y="3167746"/>
+            <a:ext cx="4564118" cy="1615827"/>
           </a:xfrm>
           <a:prstGeom prst="rect">
             <a:avLst/>
@@ -4964,7 +4900,7 @@
                 </a:highlight>
                 <a:latin typeface="Courier New" panose="02070309020205020404" pitchFamily="49" charset="0"/>
               </a:rPr>
-              <a:t>h5&gt; python publisher.py 1.1.1.1</a:t>
+              <a:t>h3&gt; python publisher.py 1.1.1.2</a:t>
             </a:r>
           </a:p>
           <a:p>
@@ -4984,16 +4920,20 @@
                 </a:highlight>
                 <a:latin typeface="Courier New" panose="02070309020205020404" pitchFamily="49" charset="0"/>
               </a:rPr>
-              <a:t>h7&gt; python publisher.py 1.1.1.2</a:t>
-            </a:r>
-          </a:p>
-          <a:p>
-            <a:pPr marL="0" indent="0" algn="just">
-              <a:lnSpc>
-                <a:spcPct val="150000"/>
-              </a:lnSpc>
-              <a:buNone/>
-            </a:pPr>
+              <a:t>h4&gt; python </a:t>
+            </a:r>
+            <a:r>
+              <a:rPr lang="en-US" dirty="0">
+                <a:solidFill>
+                  <a:srgbClr val="000000"/>
+                </a:solidFill>
+                <a:highlight>
+                  <a:srgbClr val="FFFFFF"/>
+                </a:highlight>
+                <a:latin typeface="Courier New" panose="02070309020205020404" pitchFamily="49" charset="0"/>
+              </a:rPr>
+              <a:t>subscriber</a:t>
+            </a:r>
             <a:r>
               <a:rPr lang="en-US" sz="1800" dirty="0">
                 <a:solidFill>
@@ -5004,7 +4944,7 @@
                 </a:highlight>
                 <a:latin typeface="Courier New" panose="02070309020205020404" pitchFamily="49" charset="0"/>
               </a:rPr>
-              <a:t>h5&gt; python publisher.py 10.0.0.1</a:t>
+              <a:t>.py </a:t>
             </a:r>
           </a:p>
           <a:p>
@@ -5024,19 +4964,1116 @@
                 </a:highlight>
                 <a:latin typeface="Courier New" panose="02070309020205020404" pitchFamily="49" charset="0"/>
               </a:rPr>
-              <a:t>h5&gt; python publisher.py 1.1.1.4</a:t>
+              <a:t>h1&gt; python </a:t>
+            </a:r>
+            <a:r>
+              <a:rPr lang="en-US" dirty="0">
+                <a:solidFill>
+                  <a:srgbClr val="000000"/>
+                </a:solidFill>
+                <a:highlight>
+                  <a:srgbClr val="FFFFFF"/>
+                </a:highlight>
+                <a:latin typeface="Courier New" panose="02070309020205020404" pitchFamily="49" charset="0"/>
+              </a:rPr>
+              <a:t>subscriber</a:t>
+            </a:r>
+            <a:r>
+              <a:rPr lang="en-US" sz="1800" dirty="0">
+                <a:solidFill>
+                  <a:srgbClr val="000000"/>
+                </a:solidFill>
+                <a:highlight>
+                  <a:srgbClr val="FFFFFF"/>
+                </a:highlight>
+                <a:latin typeface="Courier New" panose="02070309020205020404" pitchFamily="49" charset="0"/>
+              </a:rPr>
+              <a:t>.py</a:t>
             </a:r>
             <a:endParaRPr lang="en-US" dirty="0"/>
           </a:p>
           <a:p>
             <a:endParaRPr lang="en-US" dirty="0"/>
+          </a:p>
+        </p:txBody>
+      </p:sp>
+      <p:sp>
+        <p:nvSpPr>
+          <p:cNvPr id="10" name="TextBox 4">
+            <a:extLst>
+              <a:ext uri="{FF2B5EF4-FFF2-40B4-BE49-F238E27FC236}">
+                <a16:creationId xmlns:a16="http://schemas.microsoft.com/office/drawing/2014/main" id="{0360317E-4C8F-4021-9E87-56B9847AC2C7}"/>
+              </a:ext>
+            </a:extLst>
+          </p:cNvPr>
+          <p:cNvSpPr txBox="1"/>
+          <p:nvPr/>
+        </p:nvSpPr>
+        <p:spPr>
+          <a:xfrm>
+            <a:off x="4690710" y="4507786"/>
+            <a:ext cx="4564118" cy="1615827"/>
+          </a:xfrm>
+          <a:prstGeom prst="rect">
+            <a:avLst/>
+          </a:prstGeom>
+          <a:noFill/>
+        </p:spPr>
+        <p:txBody>
+          <a:bodyPr wrap="square" rtlCol="0">
+            <a:spAutoFit/>
+          </a:bodyPr>
+          <a:lstStyle/>
+          <a:p>
+            <a:pPr marL="0" indent="0" algn="just">
+              <a:lnSpc>
+                <a:spcPct val="150000"/>
+              </a:lnSpc>
+              <a:buNone/>
+            </a:pPr>
+            <a:r>
+              <a:rPr lang="en-US" sz="1800" dirty="0">
+                <a:solidFill>
+                  <a:srgbClr val="000000"/>
+                </a:solidFill>
+                <a:highlight>
+                  <a:srgbClr val="FFFFFF"/>
+                </a:highlight>
+                <a:latin typeface="Courier New" panose="02070309020205020404" pitchFamily="49" charset="0"/>
+              </a:rPr>
+              <a:t>h7&gt; python publisher.py 1.1.1.4</a:t>
+            </a:r>
+          </a:p>
+          <a:p>
+            <a:pPr marL="0" indent="0" algn="just">
+              <a:lnSpc>
+                <a:spcPct val="150000"/>
+              </a:lnSpc>
+              <a:buNone/>
+            </a:pPr>
+            <a:r>
+              <a:rPr lang="en-US" sz="1800" dirty="0">
+                <a:solidFill>
+                  <a:srgbClr val="000000"/>
+                </a:solidFill>
+                <a:highlight>
+                  <a:srgbClr val="FFFFFF"/>
+                </a:highlight>
+                <a:latin typeface="Courier New" panose="02070309020205020404" pitchFamily="49" charset="0"/>
+              </a:rPr>
+              <a:t>h5&gt; python </a:t>
+            </a:r>
+            <a:r>
+              <a:rPr lang="en-US" dirty="0">
+                <a:solidFill>
+                  <a:srgbClr val="000000"/>
+                </a:solidFill>
+                <a:highlight>
+                  <a:srgbClr val="FFFFFF"/>
+                </a:highlight>
+                <a:latin typeface="Courier New" panose="02070309020205020404" pitchFamily="49" charset="0"/>
+              </a:rPr>
+              <a:t>subscriber</a:t>
+            </a:r>
+            <a:r>
+              <a:rPr lang="en-US" sz="1800" dirty="0">
+                <a:solidFill>
+                  <a:srgbClr val="000000"/>
+                </a:solidFill>
+                <a:highlight>
+                  <a:srgbClr val="FFFFFF"/>
+                </a:highlight>
+                <a:latin typeface="Courier New" panose="02070309020205020404" pitchFamily="49" charset="0"/>
+              </a:rPr>
+              <a:t>.py </a:t>
+            </a:r>
+          </a:p>
+          <a:p>
+            <a:pPr marL="0" indent="0" algn="just">
+              <a:lnSpc>
+                <a:spcPct val="150000"/>
+              </a:lnSpc>
+              <a:buNone/>
+            </a:pPr>
+            <a:r>
+              <a:rPr lang="en-US" sz="1800" dirty="0">
+                <a:solidFill>
+                  <a:srgbClr val="000000"/>
+                </a:solidFill>
+                <a:highlight>
+                  <a:srgbClr val="FFFFFF"/>
+                </a:highlight>
+                <a:latin typeface="Courier New" panose="02070309020205020404" pitchFamily="49" charset="0"/>
+              </a:rPr>
+              <a:t>h6&gt; python </a:t>
+            </a:r>
+            <a:r>
+              <a:rPr lang="en-US" dirty="0">
+                <a:solidFill>
+                  <a:srgbClr val="000000"/>
+                </a:solidFill>
+                <a:highlight>
+                  <a:srgbClr val="FFFFFF"/>
+                </a:highlight>
+                <a:latin typeface="Courier New" panose="02070309020205020404" pitchFamily="49" charset="0"/>
+              </a:rPr>
+              <a:t>subscriber</a:t>
+            </a:r>
+            <a:r>
+              <a:rPr lang="en-US" sz="1800" dirty="0">
+                <a:solidFill>
+                  <a:srgbClr val="000000"/>
+                </a:solidFill>
+                <a:highlight>
+                  <a:srgbClr val="FFFFFF"/>
+                </a:highlight>
+                <a:latin typeface="Courier New" panose="02070309020205020404" pitchFamily="49" charset="0"/>
+              </a:rPr>
+              <a:t>.py</a:t>
+            </a:r>
+            <a:endParaRPr lang="en-US" dirty="0"/>
+          </a:p>
+          <a:p>
+            <a:endParaRPr lang="en-US" dirty="0"/>
+          </a:p>
+        </p:txBody>
+      </p:sp>
+      <p:sp>
+        <p:nvSpPr>
+          <p:cNvPr id="11" name="Content Placeholder 2">
+            <a:extLst>
+              <a:ext uri="{FF2B5EF4-FFF2-40B4-BE49-F238E27FC236}">
+                <a16:creationId xmlns:a16="http://schemas.microsoft.com/office/drawing/2014/main" id="{030474C2-AA1F-4CB7-8BD1-C1F9AFFE3367}"/>
+              </a:ext>
+            </a:extLst>
+          </p:cNvPr>
+          <p:cNvSpPr txBox="1">
+            <a:spLocks/>
+          </p:cNvSpPr>
+          <p:nvPr/>
+        </p:nvSpPr>
+        <p:spPr>
+          <a:xfrm>
+            <a:off x="1371600" y="2313806"/>
+            <a:ext cx="10241280" cy="1234440"/>
+          </a:xfrm>
+          <a:prstGeom prst="rect">
+            <a:avLst/>
+          </a:prstGeom>
+        </p:spPr>
+        <p:txBody>
+          <a:bodyPr vert="horz" lIns="0" tIns="0" rIns="0" bIns="0" rtlCol="0">
+            <a:normAutofit/>
+          </a:bodyPr>
+          <a:lstStyle>
+            <a:lvl1pPr marL="228600" indent="-228600" algn="l" defTabSz="914400" rtl="0" eaLnBrk="1" latinLnBrk="0" hangingPunct="1">
+              <a:lnSpc>
+                <a:spcPct val="120000"/>
+              </a:lnSpc>
+              <a:spcBef>
+                <a:spcPts val="1000"/>
+              </a:spcBef>
+              <a:buFont typeface="Arial" panose="020B0604020202020204" pitchFamily="34" charset="0"/>
+              <a:buChar char="•"/>
+              <a:defRPr sz="2000" kern="1200">
+                <a:solidFill>
+                  <a:schemeClr val="tx1"/>
+                </a:solidFill>
+                <a:latin typeface="+mn-lt"/>
+                <a:ea typeface="+mn-ea"/>
+                <a:cs typeface="+mn-cs"/>
+              </a:defRPr>
+            </a:lvl1pPr>
+            <a:lvl2pPr marL="685800" indent="-228600" algn="l" defTabSz="914400" rtl="0" eaLnBrk="1" latinLnBrk="0" hangingPunct="1">
+              <a:lnSpc>
+                <a:spcPct val="120000"/>
+              </a:lnSpc>
+              <a:spcBef>
+                <a:spcPts val="500"/>
+              </a:spcBef>
+              <a:buFont typeface="Arial" panose="020B0604020202020204" pitchFamily="34" charset="0"/>
+              <a:buChar char="•"/>
+              <a:defRPr sz="2000" kern="1200">
+                <a:solidFill>
+                  <a:schemeClr val="tx1"/>
+                </a:solidFill>
+                <a:latin typeface="+mn-lt"/>
+                <a:ea typeface="+mn-ea"/>
+                <a:cs typeface="+mn-cs"/>
+              </a:defRPr>
+            </a:lvl2pPr>
+            <a:lvl3pPr marL="1143000" indent="-228600" algn="l" defTabSz="914400" rtl="0" eaLnBrk="1" latinLnBrk="0" hangingPunct="1">
+              <a:lnSpc>
+                <a:spcPct val="120000"/>
+              </a:lnSpc>
+              <a:spcBef>
+                <a:spcPts val="500"/>
+              </a:spcBef>
+              <a:buFont typeface="Arial" panose="020B0604020202020204" pitchFamily="34" charset="0"/>
+              <a:buChar char="•"/>
+              <a:defRPr sz="1800" kern="1200">
+                <a:solidFill>
+                  <a:schemeClr val="tx1"/>
+                </a:solidFill>
+                <a:latin typeface="+mn-lt"/>
+                <a:ea typeface="+mn-ea"/>
+                <a:cs typeface="+mn-cs"/>
+              </a:defRPr>
+            </a:lvl3pPr>
+            <a:lvl4pPr marL="1600200" indent="-228600" algn="l" defTabSz="914400" rtl="0" eaLnBrk="1" latinLnBrk="0" hangingPunct="1">
+              <a:lnSpc>
+                <a:spcPct val="120000"/>
+              </a:lnSpc>
+              <a:spcBef>
+                <a:spcPts val="500"/>
+              </a:spcBef>
+              <a:buFont typeface="Arial" panose="020B0604020202020204" pitchFamily="34" charset="0"/>
+              <a:buChar char="•"/>
+              <a:defRPr sz="1600" kern="1200">
+                <a:solidFill>
+                  <a:schemeClr val="tx1"/>
+                </a:solidFill>
+                <a:latin typeface="+mn-lt"/>
+                <a:ea typeface="+mn-ea"/>
+                <a:cs typeface="+mn-cs"/>
+              </a:defRPr>
+            </a:lvl4pPr>
+            <a:lvl5pPr marL="2057400" indent="-228600" algn="l" defTabSz="914400" rtl="0" eaLnBrk="1" latinLnBrk="0" hangingPunct="1">
+              <a:lnSpc>
+                <a:spcPct val="120000"/>
+              </a:lnSpc>
+              <a:spcBef>
+                <a:spcPts val="500"/>
+              </a:spcBef>
+              <a:buFont typeface="Arial" panose="020B0604020202020204" pitchFamily="34" charset="0"/>
+              <a:buChar char="•"/>
+              <a:defRPr sz="1600" kern="1200">
+                <a:solidFill>
+                  <a:schemeClr val="tx1"/>
+                </a:solidFill>
+                <a:latin typeface="+mn-lt"/>
+                <a:ea typeface="+mn-ea"/>
+                <a:cs typeface="+mn-cs"/>
+              </a:defRPr>
+            </a:lvl5pPr>
+            <a:lvl6pPr marL="2514600" indent="-228600" algn="l" defTabSz="914400" rtl="0" eaLnBrk="1" latinLnBrk="0" hangingPunct="1">
+              <a:lnSpc>
+                <a:spcPct val="90000"/>
+              </a:lnSpc>
+              <a:spcBef>
+                <a:spcPts val="500"/>
+              </a:spcBef>
+              <a:buFont typeface="Arial" panose="020B0604020202020204" pitchFamily="34" charset="0"/>
+              <a:buChar char="•"/>
+              <a:defRPr sz="1800" kern="1200">
+                <a:solidFill>
+                  <a:schemeClr val="tx1"/>
+                </a:solidFill>
+                <a:latin typeface="+mn-lt"/>
+                <a:ea typeface="+mn-ea"/>
+                <a:cs typeface="+mn-cs"/>
+              </a:defRPr>
+            </a:lvl6pPr>
+            <a:lvl7pPr marL="2971800" indent="-228600" algn="l" defTabSz="914400" rtl="0" eaLnBrk="1" latinLnBrk="0" hangingPunct="1">
+              <a:lnSpc>
+                <a:spcPct val="90000"/>
+              </a:lnSpc>
+              <a:spcBef>
+                <a:spcPts val="500"/>
+              </a:spcBef>
+              <a:buFont typeface="Arial" panose="020B0604020202020204" pitchFamily="34" charset="0"/>
+              <a:buChar char="•"/>
+              <a:defRPr sz="1800" kern="1200">
+                <a:solidFill>
+                  <a:schemeClr val="tx1"/>
+                </a:solidFill>
+                <a:latin typeface="+mn-lt"/>
+                <a:ea typeface="+mn-ea"/>
+                <a:cs typeface="+mn-cs"/>
+              </a:defRPr>
+            </a:lvl7pPr>
+            <a:lvl8pPr marL="3429000" indent="-228600" algn="l" defTabSz="914400" rtl="0" eaLnBrk="1" latinLnBrk="0" hangingPunct="1">
+              <a:lnSpc>
+                <a:spcPct val="90000"/>
+              </a:lnSpc>
+              <a:spcBef>
+                <a:spcPts val="500"/>
+              </a:spcBef>
+              <a:buFont typeface="Arial" panose="020B0604020202020204" pitchFamily="34" charset="0"/>
+              <a:buChar char="•"/>
+              <a:defRPr sz="1800" kern="1200">
+                <a:solidFill>
+                  <a:schemeClr val="tx1"/>
+                </a:solidFill>
+                <a:latin typeface="+mn-lt"/>
+                <a:ea typeface="+mn-ea"/>
+                <a:cs typeface="+mn-cs"/>
+              </a:defRPr>
+            </a:lvl8pPr>
+            <a:lvl9pPr marL="3886200" indent="-228600" algn="l" defTabSz="914400" rtl="0" eaLnBrk="1" latinLnBrk="0" hangingPunct="1">
+              <a:lnSpc>
+                <a:spcPct val="90000"/>
+              </a:lnSpc>
+              <a:spcBef>
+                <a:spcPts val="500"/>
+              </a:spcBef>
+              <a:buFont typeface="Arial" panose="020B0604020202020204" pitchFamily="34" charset="0"/>
+              <a:buChar char="•"/>
+              <a:defRPr sz="1800" kern="1200">
+                <a:solidFill>
+                  <a:schemeClr val="tx1"/>
+                </a:solidFill>
+                <a:latin typeface="+mn-lt"/>
+                <a:ea typeface="+mn-ea"/>
+                <a:cs typeface="+mn-cs"/>
+              </a:defRPr>
+            </a:lvl9pPr>
+          </a:lstStyle>
+          <a:p>
+            <a:r>
+              <a:rPr lang="en-US" sz="1700" dirty="0"/>
+              <a:t>Run the </a:t>
+            </a:r>
+            <a:r>
+              <a:rPr lang="en-US" sz="1700" i="1" dirty="0"/>
+              <a:t>publisher-subscriber/subscriber.py on the subscriber hosts of the resource we want to test </a:t>
+            </a:r>
+          </a:p>
+          <a:p>
+            <a:r>
+              <a:rPr lang="en-US" sz="1700" dirty="0"/>
+              <a:t>Run the </a:t>
+            </a:r>
+            <a:r>
+              <a:rPr lang="en-US" sz="1700" i="1" dirty="0"/>
+              <a:t>publisher-subscriber/publisher.py on the host from which you want to do the publish</a:t>
+            </a:r>
+            <a:endParaRPr lang="en-US" sz="1700" dirty="0"/>
           </a:p>
         </p:txBody>
       </p:sp>
     </p:spTree>
     <p:extLst>
       <p:ext uri="{BB962C8B-B14F-4D97-AF65-F5344CB8AC3E}">
-        <p14:creationId xmlns:p14="http://schemas.microsoft.com/office/powerpoint/2010/main" val="2845187481"/>
+        <p14:creationId xmlns:p14="http://schemas.microsoft.com/office/powerpoint/2010/main" val="2937225549"/>
+      </p:ext>
+    </p:extLst>
+  </p:cSld>
+  <p:clrMapOvr>
+    <a:masterClrMapping/>
+  </p:clrMapOvr>
+</p:sld>
+</file>
+
+<file path=ppt/slides/slide12.xml><?xml version="1.0" encoding="utf-8"?>
+<p:sld xmlns:a="http://schemas.openxmlformats.org/drawingml/2006/main" xmlns:r="http://schemas.openxmlformats.org/officeDocument/2006/relationships" xmlns:p="http://schemas.openxmlformats.org/presentationml/2006/main">
+  <p:cSld>
+    <p:spTree>
+      <p:nvGrpSpPr>
+        <p:cNvPr id="1" name=""/>
+        <p:cNvGrpSpPr/>
+        <p:nvPr/>
+      </p:nvGrpSpPr>
+      <p:grpSpPr>
+        <a:xfrm>
+          <a:off x="0" y="0"/>
+          <a:ext cx="0" cy="0"/>
+          <a:chOff x="0" y="0"/>
+          <a:chExt cx="0" cy="0"/>
+        </a:xfrm>
+      </p:grpSpPr>
+      <p:sp>
+        <p:nvSpPr>
+          <p:cNvPr id="3" name="Segnaposto contenuto 2">
+            <a:extLst>
+              <a:ext uri="{FF2B5EF4-FFF2-40B4-BE49-F238E27FC236}">
+                <a16:creationId xmlns:a16="http://schemas.microsoft.com/office/drawing/2014/main" id="{33D18849-1007-45EA-B4B9-DAEEA5316E1F}"/>
+              </a:ext>
+            </a:extLst>
+          </p:cNvPr>
+          <p:cNvSpPr>
+            <a:spLocks noGrp="1"/>
+          </p:cNvSpPr>
+          <p:nvPr>
+            <p:ph idx="1"/>
+          </p:nvPr>
+        </p:nvSpPr>
+        <p:spPr/>
+        <p:txBody>
+          <a:bodyPr/>
+          <a:lstStyle/>
+          <a:p>
+            <a:r>
+              <a:rPr lang="en-US" dirty="0">
+                <a:latin typeface="Arial" panose="020B0604020202020204" pitchFamily="34" charset="0"/>
+              </a:rPr>
+              <a:t>Unsubscribe a user from a resource</a:t>
+            </a:r>
+          </a:p>
+          <a:p>
+            <a:r>
+              <a:rPr lang="en-US" dirty="0">
+                <a:latin typeface="Arial" panose="020B0604020202020204" pitchFamily="34" charset="0"/>
+              </a:rPr>
+              <a:t>Delete a resource</a:t>
+            </a:r>
+          </a:p>
+          <a:p>
+            <a:pPr marL="0" indent="0">
+              <a:buNone/>
+            </a:pPr>
+            <a:r>
+              <a:rPr lang="en-US" dirty="0">
+                <a:latin typeface="Arial" panose="020B0604020202020204" pitchFamily="34" charset="0"/>
+              </a:rPr>
+              <a:t>Repeat all  previous tests </a:t>
+            </a:r>
+          </a:p>
+          <a:p>
+            <a:endParaRPr lang="en-US" dirty="0">
+              <a:latin typeface="Arial" panose="020B0604020202020204" pitchFamily="34" charset="0"/>
+            </a:endParaRPr>
+          </a:p>
+          <a:p>
+            <a:pPr marL="0" indent="0">
+              <a:buNone/>
+            </a:pPr>
+            <a:endParaRPr lang="en-US" dirty="0">
+              <a:latin typeface="Arial" panose="020B0604020202020204" pitchFamily="34" charset="0"/>
+            </a:endParaRPr>
+          </a:p>
+          <a:p>
+            <a:endParaRPr lang="en-US" dirty="0"/>
+          </a:p>
+        </p:txBody>
+      </p:sp>
+      <p:sp>
+        <p:nvSpPr>
+          <p:cNvPr id="4" name="Rectangle 3">
+            <a:extLst>
+              <a:ext uri="{FF2B5EF4-FFF2-40B4-BE49-F238E27FC236}">
+                <a16:creationId xmlns:a16="http://schemas.microsoft.com/office/drawing/2014/main" id="{E775498D-6AEF-401F-9EF3-0CC678D6CA19}"/>
+              </a:ext>
+            </a:extLst>
+          </p:cNvPr>
+          <p:cNvSpPr/>
+          <p:nvPr/>
+        </p:nvSpPr>
+        <p:spPr>
+          <a:xfrm>
+            <a:off x="1847461" y="4377977"/>
+            <a:ext cx="6512768" cy="784830"/>
+          </a:xfrm>
+          <a:prstGeom prst="rect">
+            <a:avLst/>
+          </a:prstGeom>
+          <a:noFill/>
+          <a:effectLst>
+            <a:outerShdw blurRad="50800" dist="38100" dir="5400000" algn="t" rotWithShape="0">
+              <a:prstClr val="black">
+                <a:alpha val="40000"/>
+              </a:prstClr>
+            </a:outerShdw>
+          </a:effectLst>
+        </p:spPr>
+        <p:style>
+          <a:lnRef idx="2">
+            <a:schemeClr val="accent6"/>
+          </a:lnRef>
+          <a:fillRef idx="1">
+            <a:schemeClr val="lt1"/>
+          </a:fillRef>
+          <a:effectRef idx="0">
+            <a:schemeClr val="accent6"/>
+          </a:effectRef>
+          <a:fontRef idx="minor">
+            <a:schemeClr val="dk1"/>
+          </a:fontRef>
+        </p:style>
+        <p:txBody>
+          <a:bodyPr rtlCol="0" anchor="ctr"/>
+          <a:lstStyle/>
+          <a:p>
+            <a:pPr algn="ctr"/>
+            <a:endParaRPr lang="en-US"/>
+          </a:p>
+        </p:txBody>
+      </p:sp>
+      <p:sp>
+        <p:nvSpPr>
+          <p:cNvPr id="5" name="TextBox 4">
+            <a:extLst>
+              <a:ext uri="{FF2B5EF4-FFF2-40B4-BE49-F238E27FC236}">
+                <a16:creationId xmlns:a16="http://schemas.microsoft.com/office/drawing/2014/main" id="{D062E838-9293-47DA-8ABB-11E2DA490C56}"/>
+              </a:ext>
+            </a:extLst>
+          </p:cNvPr>
+          <p:cNvSpPr txBox="1"/>
+          <p:nvPr/>
+        </p:nvSpPr>
+        <p:spPr>
+          <a:xfrm>
+            <a:off x="2191500" y="4459828"/>
+            <a:ext cx="5982116" cy="784830"/>
+          </a:xfrm>
+          <a:prstGeom prst="rect">
+            <a:avLst/>
+          </a:prstGeom>
+          <a:noFill/>
+        </p:spPr>
+        <p:txBody>
+          <a:bodyPr wrap="square" rtlCol="0">
+            <a:spAutoFit/>
+          </a:bodyPr>
+          <a:lstStyle/>
+          <a:p>
+            <a:pPr marL="0" indent="0" algn="just">
+              <a:lnSpc>
+                <a:spcPct val="150000"/>
+              </a:lnSpc>
+              <a:buNone/>
+            </a:pPr>
+            <a:r>
+              <a:rPr lang="en-US" sz="1800" dirty="0">
+                <a:solidFill>
+                  <a:srgbClr val="000000"/>
+                </a:solidFill>
+                <a:highlight>
+                  <a:srgbClr val="FFFFFF"/>
+                </a:highlight>
+                <a:latin typeface="Courier New" panose="02070309020205020404" pitchFamily="49" charset="0"/>
+              </a:rPr>
+              <a:t>python configuration/delete_unsubscribe.py </a:t>
+            </a:r>
+          </a:p>
+          <a:p>
+            <a:endParaRPr lang="en-US" dirty="0"/>
+          </a:p>
+        </p:txBody>
+      </p:sp>
+      <p:sp>
+        <p:nvSpPr>
+          <p:cNvPr id="6" name="Titolo 1">
+            <a:extLst>
+              <a:ext uri="{FF2B5EF4-FFF2-40B4-BE49-F238E27FC236}">
+                <a16:creationId xmlns:a16="http://schemas.microsoft.com/office/drawing/2014/main" id="{04B85004-A32D-4CD4-AAC5-5883CA8E722D}"/>
+              </a:ext>
+            </a:extLst>
+          </p:cNvPr>
+          <p:cNvSpPr>
+            <a:spLocks noGrp="1"/>
+          </p:cNvSpPr>
+          <p:nvPr>
+            <p:ph type="title"/>
+          </p:nvPr>
+        </p:nvSpPr>
+        <p:spPr>
+          <a:xfrm>
+            <a:off x="1371600" y="795338"/>
+            <a:ext cx="10240963" cy="1235075"/>
+          </a:xfrm>
+        </p:spPr>
+        <p:txBody>
+          <a:bodyPr/>
+          <a:lstStyle/>
+          <a:p>
+            <a:r>
+              <a:rPr lang="it-IT" dirty="0" err="1"/>
+              <a:t>Publish</a:t>
+            </a:r>
+            <a:r>
+              <a:rPr lang="it-IT" dirty="0"/>
+              <a:t> a </a:t>
+            </a:r>
+            <a:r>
+              <a:rPr lang="it-IT" dirty="0" err="1"/>
+              <a:t>udp</a:t>
+            </a:r>
+            <a:r>
+              <a:rPr lang="it-IT" dirty="0"/>
+              <a:t> </a:t>
+            </a:r>
+            <a:r>
+              <a:rPr lang="it-IT" dirty="0" err="1"/>
+              <a:t>message</a:t>
+            </a:r>
+            <a:r>
+              <a:rPr lang="it-IT" dirty="0"/>
+              <a:t> (2)</a:t>
+            </a:r>
+            <a:endParaRPr lang="en-US" dirty="0"/>
+          </a:p>
+        </p:txBody>
+      </p:sp>
+    </p:spTree>
+    <p:extLst>
+      <p:ext uri="{BB962C8B-B14F-4D97-AF65-F5344CB8AC3E}">
+        <p14:creationId xmlns:p14="http://schemas.microsoft.com/office/powerpoint/2010/main" val="1175231054"/>
+      </p:ext>
+    </p:extLst>
+  </p:cSld>
+  <p:clrMapOvr>
+    <a:masterClrMapping/>
+  </p:clrMapOvr>
+</p:sld>
+</file>
+
+<file path=ppt/slides/slide13.xml><?xml version="1.0" encoding="utf-8"?>
+<p:sld xmlns:a="http://schemas.openxmlformats.org/drawingml/2006/main" xmlns:r="http://schemas.openxmlformats.org/officeDocument/2006/relationships" xmlns:p="http://schemas.openxmlformats.org/presentationml/2006/main">
+  <p:cSld>
+    <p:spTree>
+      <p:nvGrpSpPr>
+        <p:cNvPr id="1" name=""/>
+        <p:cNvGrpSpPr/>
+        <p:nvPr/>
+      </p:nvGrpSpPr>
+      <p:grpSpPr>
+        <a:xfrm>
+          <a:off x="0" y="0"/>
+          <a:ext cx="0" cy="0"/>
+          <a:chOff x="0" y="0"/>
+          <a:chExt cx="0" cy="0"/>
+        </a:xfrm>
+      </p:grpSpPr>
+      <p:sp>
+        <p:nvSpPr>
+          <p:cNvPr id="3" name="Segnaposto contenuto 2">
+            <a:extLst>
+              <a:ext uri="{FF2B5EF4-FFF2-40B4-BE49-F238E27FC236}">
+                <a16:creationId xmlns:a16="http://schemas.microsoft.com/office/drawing/2014/main" id="{E61576CB-6BE0-4AF1-95F4-4B16C4F6C87B}"/>
+              </a:ext>
+            </a:extLst>
+          </p:cNvPr>
+          <p:cNvSpPr>
+            <a:spLocks noGrp="1"/>
+          </p:cNvSpPr>
+          <p:nvPr>
+            <p:ph idx="1"/>
+          </p:nvPr>
+        </p:nvSpPr>
+        <p:spPr/>
+        <p:txBody>
+          <a:bodyPr/>
+          <a:lstStyle/>
+          <a:p>
+            <a:r>
+              <a:rPr lang="en-US" b="0" i="0" dirty="0">
+                <a:effectLst/>
+                <a:latin typeface="Arial" panose="020B0604020202020204" pitchFamily="34" charset="0"/>
+              </a:rPr>
+              <a:t>Publish an UDP message on a resource you are subscribed to</a:t>
+            </a:r>
+          </a:p>
+          <a:p>
+            <a:r>
+              <a:rPr lang="en-US" b="0" i="0" dirty="0">
+                <a:effectLst/>
+                <a:latin typeface="Arial" panose="020B0604020202020204" pitchFamily="34" charset="0"/>
+              </a:rPr>
+              <a:t>Send an UDP message to a host using its real address</a:t>
+            </a:r>
+          </a:p>
+          <a:p>
+            <a:endParaRPr lang="en-US" dirty="0"/>
+          </a:p>
+        </p:txBody>
+      </p:sp>
+      <p:sp>
+        <p:nvSpPr>
+          <p:cNvPr id="4" name="Titolo 1">
+            <a:extLst>
+              <a:ext uri="{FF2B5EF4-FFF2-40B4-BE49-F238E27FC236}">
+                <a16:creationId xmlns:a16="http://schemas.microsoft.com/office/drawing/2014/main" id="{7C78603E-27DF-40BF-AAB7-4361E6A45C8A}"/>
+              </a:ext>
+            </a:extLst>
+          </p:cNvPr>
+          <p:cNvSpPr>
+            <a:spLocks noGrp="1"/>
+          </p:cNvSpPr>
+          <p:nvPr>
+            <p:ph type="title"/>
+          </p:nvPr>
+        </p:nvSpPr>
+        <p:spPr>
+          <a:xfrm>
+            <a:off x="1371600" y="795338"/>
+            <a:ext cx="10240963" cy="1235075"/>
+          </a:xfrm>
+        </p:spPr>
+        <p:txBody>
+          <a:bodyPr/>
+          <a:lstStyle/>
+          <a:p>
+            <a:r>
+              <a:rPr lang="it-IT" dirty="0" err="1"/>
+              <a:t>Publish</a:t>
+            </a:r>
+            <a:r>
+              <a:rPr lang="it-IT" dirty="0"/>
+              <a:t> a </a:t>
+            </a:r>
+            <a:r>
+              <a:rPr lang="it-IT" dirty="0" err="1"/>
+              <a:t>udp</a:t>
+            </a:r>
+            <a:r>
+              <a:rPr lang="it-IT" dirty="0"/>
+              <a:t> </a:t>
+            </a:r>
+            <a:r>
+              <a:rPr lang="it-IT" dirty="0" err="1"/>
+              <a:t>message</a:t>
+            </a:r>
+            <a:r>
+              <a:rPr lang="it-IT" dirty="0"/>
+              <a:t> (3)</a:t>
+            </a:r>
+            <a:endParaRPr lang="en-US" dirty="0"/>
+          </a:p>
+        </p:txBody>
+      </p:sp>
+      <p:sp>
+        <p:nvSpPr>
+          <p:cNvPr id="5" name="Rectangle 3">
+            <a:extLst>
+              <a:ext uri="{FF2B5EF4-FFF2-40B4-BE49-F238E27FC236}">
+                <a16:creationId xmlns:a16="http://schemas.microsoft.com/office/drawing/2014/main" id="{2F417117-F913-4382-AA0A-EF13631E4273}"/>
+              </a:ext>
+            </a:extLst>
+          </p:cNvPr>
+          <p:cNvSpPr/>
+          <p:nvPr/>
+        </p:nvSpPr>
+        <p:spPr>
+          <a:xfrm>
+            <a:off x="1371600" y="3669841"/>
+            <a:ext cx="4564117" cy="1749972"/>
+          </a:xfrm>
+          <a:prstGeom prst="rect">
+            <a:avLst/>
+          </a:prstGeom>
+          <a:noFill/>
+          <a:effectLst>
+            <a:outerShdw blurRad="50800" dist="38100" dir="5400000" algn="t" rotWithShape="0">
+              <a:prstClr val="black">
+                <a:alpha val="40000"/>
+              </a:prstClr>
+            </a:outerShdw>
+          </a:effectLst>
+        </p:spPr>
+        <p:style>
+          <a:lnRef idx="2">
+            <a:schemeClr val="accent6"/>
+          </a:lnRef>
+          <a:fillRef idx="1">
+            <a:schemeClr val="lt1"/>
+          </a:fillRef>
+          <a:effectRef idx="0">
+            <a:schemeClr val="accent6"/>
+          </a:effectRef>
+          <a:fontRef idx="minor">
+            <a:schemeClr val="dk1"/>
+          </a:fontRef>
+        </p:style>
+        <p:txBody>
+          <a:bodyPr rtlCol="0" anchor="ctr"/>
+          <a:lstStyle/>
+          <a:p>
+            <a:pPr algn="ctr"/>
+            <a:endParaRPr lang="en-US"/>
+          </a:p>
+        </p:txBody>
+      </p:sp>
+      <p:sp>
+        <p:nvSpPr>
+          <p:cNvPr id="6" name="TextBox 4">
+            <a:extLst>
+              <a:ext uri="{FF2B5EF4-FFF2-40B4-BE49-F238E27FC236}">
+                <a16:creationId xmlns:a16="http://schemas.microsoft.com/office/drawing/2014/main" id="{19A40AF6-EEE6-4BB2-8C63-B5B50F86D7D2}"/>
+              </a:ext>
+            </a:extLst>
+          </p:cNvPr>
+          <p:cNvSpPr txBox="1"/>
+          <p:nvPr/>
+        </p:nvSpPr>
+        <p:spPr>
+          <a:xfrm>
+            <a:off x="1496888" y="3736914"/>
+            <a:ext cx="4564118" cy="1615827"/>
+          </a:xfrm>
+          <a:prstGeom prst="rect">
+            <a:avLst/>
+          </a:prstGeom>
+          <a:noFill/>
+        </p:spPr>
+        <p:txBody>
+          <a:bodyPr wrap="square" rtlCol="0">
+            <a:spAutoFit/>
+          </a:bodyPr>
+          <a:lstStyle/>
+          <a:p>
+            <a:pPr marL="0" indent="0" algn="just">
+              <a:lnSpc>
+                <a:spcPct val="150000"/>
+              </a:lnSpc>
+              <a:buNone/>
+            </a:pPr>
+            <a:r>
+              <a:rPr lang="en-US" sz="1800" dirty="0">
+                <a:solidFill>
+                  <a:srgbClr val="000000"/>
+                </a:solidFill>
+                <a:highlight>
+                  <a:srgbClr val="FFFFFF"/>
+                </a:highlight>
+                <a:latin typeface="Courier New" panose="02070309020205020404" pitchFamily="49" charset="0"/>
+              </a:rPr>
+              <a:t>h1&gt; python publisher.py 1.1.1.1</a:t>
+            </a:r>
+          </a:p>
+          <a:p>
+            <a:pPr marL="0" indent="0" algn="just">
+              <a:lnSpc>
+                <a:spcPct val="150000"/>
+              </a:lnSpc>
+              <a:buNone/>
+            </a:pPr>
+            <a:r>
+              <a:rPr lang="en-US" sz="1800" dirty="0">
+                <a:solidFill>
+                  <a:srgbClr val="000000"/>
+                </a:solidFill>
+                <a:highlight>
+                  <a:srgbClr val="FFFFFF"/>
+                </a:highlight>
+                <a:latin typeface="Courier New" panose="02070309020205020404" pitchFamily="49" charset="0"/>
+              </a:rPr>
+              <a:t>h1&gt; python </a:t>
+            </a:r>
+            <a:r>
+              <a:rPr lang="en-US" dirty="0">
+                <a:solidFill>
+                  <a:srgbClr val="000000"/>
+                </a:solidFill>
+                <a:highlight>
+                  <a:srgbClr val="FFFFFF"/>
+                </a:highlight>
+                <a:latin typeface="Courier New" panose="02070309020205020404" pitchFamily="49" charset="0"/>
+              </a:rPr>
+              <a:t>subscriber</a:t>
+            </a:r>
+            <a:r>
+              <a:rPr lang="en-US" sz="1800" dirty="0">
+                <a:solidFill>
+                  <a:srgbClr val="000000"/>
+                </a:solidFill>
+                <a:highlight>
+                  <a:srgbClr val="FFFFFF"/>
+                </a:highlight>
+                <a:latin typeface="Courier New" panose="02070309020205020404" pitchFamily="49" charset="0"/>
+              </a:rPr>
+              <a:t>.py </a:t>
+            </a:r>
+          </a:p>
+          <a:p>
+            <a:pPr marL="0" indent="0" algn="just">
+              <a:lnSpc>
+                <a:spcPct val="150000"/>
+              </a:lnSpc>
+              <a:buNone/>
+            </a:pPr>
+            <a:r>
+              <a:rPr lang="en-US" sz="1800" dirty="0">
+                <a:solidFill>
+                  <a:srgbClr val="000000"/>
+                </a:solidFill>
+                <a:highlight>
+                  <a:srgbClr val="FFFFFF"/>
+                </a:highlight>
+                <a:latin typeface="Courier New" panose="02070309020205020404" pitchFamily="49" charset="0"/>
+              </a:rPr>
+              <a:t>h3&gt; python </a:t>
+            </a:r>
+            <a:r>
+              <a:rPr lang="en-US" dirty="0">
+                <a:solidFill>
+                  <a:srgbClr val="000000"/>
+                </a:solidFill>
+                <a:highlight>
+                  <a:srgbClr val="FFFFFF"/>
+                </a:highlight>
+                <a:latin typeface="Courier New" panose="02070309020205020404" pitchFamily="49" charset="0"/>
+              </a:rPr>
+              <a:t>subscriber</a:t>
+            </a:r>
+            <a:r>
+              <a:rPr lang="en-US" sz="1800" dirty="0">
+                <a:solidFill>
+                  <a:srgbClr val="000000"/>
+                </a:solidFill>
+                <a:highlight>
+                  <a:srgbClr val="FFFFFF"/>
+                </a:highlight>
+                <a:latin typeface="Courier New" panose="02070309020205020404" pitchFamily="49" charset="0"/>
+              </a:rPr>
+              <a:t>.py</a:t>
+            </a:r>
+            <a:endParaRPr lang="en-US" dirty="0"/>
+          </a:p>
+          <a:p>
+            <a:endParaRPr lang="en-US" dirty="0"/>
+          </a:p>
+        </p:txBody>
+      </p:sp>
+      <p:sp>
+        <p:nvSpPr>
+          <p:cNvPr id="7" name="Rectangle 3">
+            <a:extLst>
+              <a:ext uri="{FF2B5EF4-FFF2-40B4-BE49-F238E27FC236}">
+                <a16:creationId xmlns:a16="http://schemas.microsoft.com/office/drawing/2014/main" id="{09A4FB69-2D4A-4756-B69B-F69FC547299A}"/>
+              </a:ext>
+            </a:extLst>
+          </p:cNvPr>
+          <p:cNvSpPr/>
+          <p:nvPr/>
+        </p:nvSpPr>
+        <p:spPr>
+          <a:xfrm>
+            <a:off x="6241663" y="3669841"/>
+            <a:ext cx="4689406" cy="1749972"/>
+          </a:xfrm>
+          <a:prstGeom prst="rect">
+            <a:avLst/>
+          </a:prstGeom>
+          <a:noFill/>
+          <a:effectLst>
+            <a:outerShdw blurRad="50800" dist="38100" dir="5400000" algn="t" rotWithShape="0">
+              <a:prstClr val="black">
+                <a:alpha val="40000"/>
+              </a:prstClr>
+            </a:outerShdw>
+          </a:effectLst>
+        </p:spPr>
+        <p:style>
+          <a:lnRef idx="2">
+            <a:schemeClr val="accent6"/>
+          </a:lnRef>
+          <a:fillRef idx="1">
+            <a:schemeClr val="lt1"/>
+          </a:fillRef>
+          <a:effectRef idx="0">
+            <a:schemeClr val="accent6"/>
+          </a:effectRef>
+          <a:fontRef idx="minor">
+            <a:schemeClr val="dk1"/>
+          </a:fontRef>
+        </p:style>
+        <p:txBody>
+          <a:bodyPr rtlCol="0" anchor="ctr"/>
+          <a:lstStyle/>
+          <a:p>
+            <a:pPr algn="ctr"/>
+            <a:endParaRPr lang="en-US"/>
+          </a:p>
+        </p:txBody>
+      </p:sp>
+      <p:sp>
+        <p:nvSpPr>
+          <p:cNvPr id="8" name="TextBox 4">
+            <a:extLst>
+              <a:ext uri="{FF2B5EF4-FFF2-40B4-BE49-F238E27FC236}">
+                <a16:creationId xmlns:a16="http://schemas.microsoft.com/office/drawing/2014/main" id="{E197925B-0B93-412B-9F9D-435CEDB63928}"/>
+              </a:ext>
+            </a:extLst>
+          </p:cNvPr>
+          <p:cNvSpPr txBox="1"/>
+          <p:nvPr/>
+        </p:nvSpPr>
+        <p:spPr>
+          <a:xfrm>
+            <a:off x="6256282" y="3736914"/>
+            <a:ext cx="4564118" cy="888705"/>
+          </a:xfrm>
+          <a:prstGeom prst="rect">
+            <a:avLst/>
+          </a:prstGeom>
+          <a:noFill/>
+        </p:spPr>
+        <p:txBody>
+          <a:bodyPr wrap="square" rtlCol="0">
+            <a:spAutoFit/>
+          </a:bodyPr>
+          <a:lstStyle/>
+          <a:p>
+            <a:pPr marL="0" indent="0" algn="just">
+              <a:lnSpc>
+                <a:spcPct val="150000"/>
+              </a:lnSpc>
+              <a:buNone/>
+            </a:pPr>
+            <a:r>
+              <a:rPr lang="en-US" sz="1800" dirty="0">
+                <a:solidFill>
+                  <a:srgbClr val="000000"/>
+                </a:solidFill>
+                <a:highlight>
+                  <a:srgbClr val="FFFFFF"/>
+                </a:highlight>
+                <a:latin typeface="Courier New" panose="02070309020205020404" pitchFamily="49" charset="0"/>
+              </a:rPr>
+              <a:t>h1&gt; python publisher.py 10.0.0.2</a:t>
+            </a:r>
+          </a:p>
+          <a:p>
+            <a:pPr marL="0" indent="0" algn="just">
+              <a:lnSpc>
+                <a:spcPct val="150000"/>
+              </a:lnSpc>
+              <a:buNone/>
+            </a:pPr>
+            <a:r>
+              <a:rPr lang="en-US" sz="1800" dirty="0">
+                <a:solidFill>
+                  <a:srgbClr val="000000"/>
+                </a:solidFill>
+                <a:highlight>
+                  <a:srgbClr val="FFFFFF"/>
+                </a:highlight>
+                <a:latin typeface="Courier New" panose="02070309020205020404" pitchFamily="49" charset="0"/>
+              </a:rPr>
+              <a:t>h2&gt; python </a:t>
+            </a:r>
+            <a:r>
+              <a:rPr lang="en-US" dirty="0">
+                <a:solidFill>
+                  <a:srgbClr val="000000"/>
+                </a:solidFill>
+                <a:highlight>
+                  <a:srgbClr val="FFFFFF"/>
+                </a:highlight>
+                <a:latin typeface="Courier New" panose="02070309020205020404" pitchFamily="49" charset="0"/>
+              </a:rPr>
+              <a:t>subscriber</a:t>
+            </a:r>
+            <a:r>
+              <a:rPr lang="en-US" sz="1800" dirty="0">
+                <a:solidFill>
+                  <a:srgbClr val="000000"/>
+                </a:solidFill>
+                <a:highlight>
+                  <a:srgbClr val="FFFFFF"/>
+                </a:highlight>
+                <a:latin typeface="Courier New" panose="02070309020205020404" pitchFamily="49" charset="0"/>
+              </a:rPr>
+              <a:t>.py </a:t>
+            </a:r>
+          </a:p>
+        </p:txBody>
+      </p:sp>
+    </p:spTree>
+    <p:extLst>
+      <p:ext uri="{BB962C8B-B14F-4D97-AF65-F5344CB8AC3E}">
+        <p14:creationId xmlns:p14="http://schemas.microsoft.com/office/powerpoint/2010/main" val="1599007660"/>
       </p:ext>
     </p:extLst>
   </p:cSld>
@@ -6736,13 +7773,18 @@
           <a:lstStyle/>
           <a:p>
             <a:r>
-              <a:rPr lang="en-US" sz="4000" spc="750" dirty="0">
+              <a:rPr lang="en-US" sz="4000" spc="750" dirty="0" err="1">
                 <a:solidFill>
                   <a:schemeClr val="bg1"/>
                 </a:solidFill>
               </a:rPr>
-              <a:t>TEST PLAN</a:t>
-            </a:r>
+              <a:t>TESTing</a:t>
+            </a:r>
+            <a:endParaRPr lang="en-US" sz="4000" spc="750" dirty="0">
+              <a:solidFill>
+                <a:schemeClr val="bg1"/>
+              </a:solidFill>
+            </a:endParaRPr>
           </a:p>
         </p:txBody>
       </p:sp>
@@ -6838,7 +7880,7 @@
           <a:p>
             <a:r>
               <a:rPr lang="en-US" dirty="0"/>
-              <a:t>Test plan (1)</a:t>
+              <a:t>Testing configuration</a:t>
             </a:r>
           </a:p>
         </p:txBody>
@@ -6861,39 +7903,52 @@
         </p:nvSpPr>
         <p:spPr>
           <a:xfrm>
-            <a:off x="1371600" y="2163037"/>
-            <a:ext cx="10241280" cy="2531925"/>
+            <a:off x="1371600" y="2231131"/>
+            <a:ext cx="5453974" cy="1786393"/>
           </a:xfrm>
         </p:spPr>
         <p:txBody>
           <a:bodyPr/>
           <a:lstStyle/>
           <a:p>
-            <a:pPr marL="457200" indent="-457200">
-              <a:buFont typeface="+mj-lt"/>
-              <a:buAutoNum type="arabicPeriod"/>
+            <a:pPr marL="0" indent="0">
+              <a:buNone/>
             </a:pPr>
             <a:r>
               <a:rPr lang="en-US" dirty="0"/>
-              <a:t>First you need to configure the system. After starting the controller you have to execute the </a:t>
-            </a:r>
+              <a:t>1) Configure the system through REST API: </a:t>
+            </a:r>
+          </a:p>
+          <a:p>
+            <a:pPr lvl="1"/>
+            <a:r>
+              <a:rPr lang="en-US" dirty="0"/>
+              <a:t>Start the controller</a:t>
+            </a:r>
+          </a:p>
+          <a:p>
+            <a:pPr lvl="1"/>
             <a:r>
               <a:rPr lang="en-US" i="1" dirty="0"/>
-              <a:t>configuration/creation_resource.py </a:t>
-            </a:r>
-            <a:r>
-              <a:rPr lang="en-US" dirty="0"/>
-              <a:t>that permit to create some test resources. </a:t>
-            </a:r>
+              <a:t>Run configuration/creation_resource.py</a:t>
+            </a:r>
+          </a:p>
+          <a:p>
+            <a:pPr lvl="1"/>
+            <a:r>
+              <a:rPr lang="en-US" i="1" dirty="0"/>
+              <a:t>Run configuration/subscribe_resource.py </a:t>
+            </a:r>
+            <a:endParaRPr lang="en-US" dirty="0"/>
           </a:p>
         </p:txBody>
       </p:sp>
       <p:pic>
         <p:nvPicPr>
-          <p:cNvPr id="5" name="Picture 4" descr="Diagram&#10;&#10;Description automatically generated">
-            <a:extLst>
-              <a:ext uri="{FF2B5EF4-FFF2-40B4-BE49-F238E27FC236}">
-                <a16:creationId xmlns:a16="http://schemas.microsoft.com/office/drawing/2014/main" id="{964C6C6B-2D81-40CE-9458-33DBB07B3850}"/>
+          <p:cNvPr id="6" name="Immagine 5">
+            <a:extLst>
+              <a:ext uri="{FF2B5EF4-FFF2-40B4-BE49-F238E27FC236}">
+                <a16:creationId xmlns:a16="http://schemas.microsoft.com/office/drawing/2014/main" id="{194EBFE3-8311-47E3-855D-9C06AD598F3A}"/>
               </a:ext>
             </a:extLst>
           </p:cNvPr>
@@ -6916,14 +7971,231 @@
         </p:blipFill>
         <p:spPr>
           <a:xfrm>
-            <a:off x="3667328" y="2992089"/>
-            <a:ext cx="5661498" cy="3405745"/>
+            <a:off x="6825574" y="2373098"/>
+            <a:ext cx="4950498" cy="3026379"/>
           </a:xfrm>
           <a:prstGeom prst="rect">
             <a:avLst/>
           </a:prstGeom>
         </p:spPr>
       </p:pic>
+      <p:sp>
+        <p:nvSpPr>
+          <p:cNvPr id="8" name="Content Placeholder 2">
+            <a:extLst>
+              <a:ext uri="{FF2B5EF4-FFF2-40B4-BE49-F238E27FC236}">
+                <a16:creationId xmlns:a16="http://schemas.microsoft.com/office/drawing/2014/main" id="{DCE28C10-9C90-4898-8E01-FB44128632C5}"/>
+              </a:ext>
+            </a:extLst>
+          </p:cNvPr>
+          <p:cNvSpPr txBox="1">
+            <a:spLocks/>
+          </p:cNvSpPr>
+          <p:nvPr/>
+        </p:nvSpPr>
+        <p:spPr>
+          <a:xfrm>
+            <a:off x="1371600" y="4218687"/>
+            <a:ext cx="4815191" cy="1467684"/>
+          </a:xfrm>
+          <a:prstGeom prst="rect">
+            <a:avLst/>
+          </a:prstGeom>
+        </p:spPr>
+        <p:txBody>
+          <a:bodyPr vert="horz" lIns="0" tIns="0" rIns="0" bIns="0" rtlCol="0">
+            <a:normAutofit/>
+          </a:bodyPr>
+          <a:lstStyle>
+            <a:lvl1pPr marL="228600" indent="-228600" algn="l" defTabSz="914400" rtl="0" eaLnBrk="1" latinLnBrk="0" hangingPunct="1">
+              <a:lnSpc>
+                <a:spcPct val="120000"/>
+              </a:lnSpc>
+              <a:spcBef>
+                <a:spcPts val="1000"/>
+              </a:spcBef>
+              <a:buFont typeface="Arial" panose="020B0604020202020204" pitchFamily="34" charset="0"/>
+              <a:buChar char="•"/>
+              <a:defRPr sz="2000" kern="1200">
+                <a:solidFill>
+                  <a:schemeClr val="tx1"/>
+                </a:solidFill>
+                <a:latin typeface="+mn-lt"/>
+                <a:ea typeface="+mn-ea"/>
+                <a:cs typeface="+mn-cs"/>
+              </a:defRPr>
+            </a:lvl1pPr>
+            <a:lvl2pPr marL="685800" indent="-228600" algn="l" defTabSz="914400" rtl="0" eaLnBrk="1" latinLnBrk="0" hangingPunct="1">
+              <a:lnSpc>
+                <a:spcPct val="120000"/>
+              </a:lnSpc>
+              <a:spcBef>
+                <a:spcPts val="500"/>
+              </a:spcBef>
+              <a:buFont typeface="Arial" panose="020B0604020202020204" pitchFamily="34" charset="0"/>
+              <a:buChar char="•"/>
+              <a:defRPr sz="2000" kern="1200">
+                <a:solidFill>
+                  <a:schemeClr val="tx1"/>
+                </a:solidFill>
+                <a:latin typeface="+mn-lt"/>
+                <a:ea typeface="+mn-ea"/>
+                <a:cs typeface="+mn-cs"/>
+              </a:defRPr>
+            </a:lvl2pPr>
+            <a:lvl3pPr marL="1143000" indent="-228600" algn="l" defTabSz="914400" rtl="0" eaLnBrk="1" latinLnBrk="0" hangingPunct="1">
+              <a:lnSpc>
+                <a:spcPct val="120000"/>
+              </a:lnSpc>
+              <a:spcBef>
+                <a:spcPts val="500"/>
+              </a:spcBef>
+              <a:buFont typeface="Arial" panose="020B0604020202020204" pitchFamily="34" charset="0"/>
+              <a:buChar char="•"/>
+              <a:defRPr sz="1800" kern="1200">
+                <a:solidFill>
+                  <a:schemeClr val="tx1"/>
+                </a:solidFill>
+                <a:latin typeface="+mn-lt"/>
+                <a:ea typeface="+mn-ea"/>
+                <a:cs typeface="+mn-cs"/>
+              </a:defRPr>
+            </a:lvl3pPr>
+            <a:lvl4pPr marL="1600200" indent="-228600" algn="l" defTabSz="914400" rtl="0" eaLnBrk="1" latinLnBrk="0" hangingPunct="1">
+              <a:lnSpc>
+                <a:spcPct val="120000"/>
+              </a:lnSpc>
+              <a:spcBef>
+                <a:spcPts val="500"/>
+              </a:spcBef>
+              <a:buFont typeface="Arial" panose="020B0604020202020204" pitchFamily="34" charset="0"/>
+              <a:buChar char="•"/>
+              <a:defRPr sz="1600" kern="1200">
+                <a:solidFill>
+                  <a:schemeClr val="tx1"/>
+                </a:solidFill>
+                <a:latin typeface="+mn-lt"/>
+                <a:ea typeface="+mn-ea"/>
+                <a:cs typeface="+mn-cs"/>
+              </a:defRPr>
+            </a:lvl4pPr>
+            <a:lvl5pPr marL="2057400" indent="-228600" algn="l" defTabSz="914400" rtl="0" eaLnBrk="1" latinLnBrk="0" hangingPunct="1">
+              <a:lnSpc>
+                <a:spcPct val="120000"/>
+              </a:lnSpc>
+              <a:spcBef>
+                <a:spcPts val="500"/>
+              </a:spcBef>
+              <a:buFont typeface="Arial" panose="020B0604020202020204" pitchFamily="34" charset="0"/>
+              <a:buChar char="•"/>
+              <a:defRPr sz="1600" kern="1200">
+                <a:solidFill>
+                  <a:schemeClr val="tx1"/>
+                </a:solidFill>
+                <a:latin typeface="+mn-lt"/>
+                <a:ea typeface="+mn-ea"/>
+                <a:cs typeface="+mn-cs"/>
+              </a:defRPr>
+            </a:lvl5pPr>
+            <a:lvl6pPr marL="2514600" indent="-228600" algn="l" defTabSz="914400" rtl="0" eaLnBrk="1" latinLnBrk="0" hangingPunct="1">
+              <a:lnSpc>
+                <a:spcPct val="90000"/>
+              </a:lnSpc>
+              <a:spcBef>
+                <a:spcPts val="500"/>
+              </a:spcBef>
+              <a:buFont typeface="Arial" panose="020B0604020202020204" pitchFamily="34" charset="0"/>
+              <a:buChar char="•"/>
+              <a:defRPr sz="1800" kern="1200">
+                <a:solidFill>
+                  <a:schemeClr val="tx1"/>
+                </a:solidFill>
+                <a:latin typeface="+mn-lt"/>
+                <a:ea typeface="+mn-ea"/>
+                <a:cs typeface="+mn-cs"/>
+              </a:defRPr>
+            </a:lvl6pPr>
+            <a:lvl7pPr marL="2971800" indent="-228600" algn="l" defTabSz="914400" rtl="0" eaLnBrk="1" latinLnBrk="0" hangingPunct="1">
+              <a:lnSpc>
+                <a:spcPct val="90000"/>
+              </a:lnSpc>
+              <a:spcBef>
+                <a:spcPts val="500"/>
+              </a:spcBef>
+              <a:buFont typeface="Arial" panose="020B0604020202020204" pitchFamily="34" charset="0"/>
+              <a:buChar char="•"/>
+              <a:defRPr sz="1800" kern="1200">
+                <a:solidFill>
+                  <a:schemeClr val="tx1"/>
+                </a:solidFill>
+                <a:latin typeface="+mn-lt"/>
+                <a:ea typeface="+mn-ea"/>
+                <a:cs typeface="+mn-cs"/>
+              </a:defRPr>
+            </a:lvl7pPr>
+            <a:lvl8pPr marL="3429000" indent="-228600" algn="l" defTabSz="914400" rtl="0" eaLnBrk="1" latinLnBrk="0" hangingPunct="1">
+              <a:lnSpc>
+                <a:spcPct val="90000"/>
+              </a:lnSpc>
+              <a:spcBef>
+                <a:spcPts val="500"/>
+              </a:spcBef>
+              <a:buFont typeface="Arial" panose="020B0604020202020204" pitchFamily="34" charset="0"/>
+              <a:buChar char="•"/>
+              <a:defRPr sz="1800" kern="1200">
+                <a:solidFill>
+                  <a:schemeClr val="tx1"/>
+                </a:solidFill>
+                <a:latin typeface="+mn-lt"/>
+                <a:ea typeface="+mn-ea"/>
+                <a:cs typeface="+mn-cs"/>
+              </a:defRPr>
+            </a:lvl8pPr>
+            <a:lvl9pPr marL="3886200" indent="-228600" algn="l" defTabSz="914400" rtl="0" eaLnBrk="1" latinLnBrk="0" hangingPunct="1">
+              <a:lnSpc>
+                <a:spcPct val="90000"/>
+              </a:lnSpc>
+              <a:spcBef>
+                <a:spcPts val="500"/>
+              </a:spcBef>
+              <a:buFont typeface="Arial" panose="020B0604020202020204" pitchFamily="34" charset="0"/>
+              <a:buChar char="•"/>
+              <a:defRPr sz="1800" kern="1200">
+                <a:solidFill>
+                  <a:schemeClr val="tx1"/>
+                </a:solidFill>
+                <a:latin typeface="+mn-lt"/>
+                <a:ea typeface="+mn-ea"/>
+                <a:cs typeface="+mn-cs"/>
+              </a:defRPr>
+            </a:lvl9pPr>
+          </a:lstStyle>
+          <a:p>
+            <a:pPr marL="0" indent="0">
+              <a:buNone/>
+            </a:pPr>
+            <a:r>
+              <a:rPr lang="en-US" dirty="0"/>
+              <a:t>2) Create the topology with Mininet</a:t>
+            </a:r>
+          </a:p>
+          <a:p>
+            <a:pPr lvl="1"/>
+            <a:r>
+              <a:rPr lang="en-US" dirty="0"/>
+              <a:t>Run the </a:t>
+            </a:r>
+            <a:r>
+              <a:rPr lang="en-US" i="1" dirty="0"/>
+              <a:t>topology/topology.py</a:t>
+            </a:r>
+            <a:r>
+              <a:rPr lang="en-US" dirty="0"/>
+              <a:t> </a:t>
+            </a:r>
+          </a:p>
+        </p:txBody>
+      </p:sp>
     </p:spTree>
     <p:extLst>
       <p:ext uri="{BB962C8B-B14F-4D97-AF65-F5344CB8AC3E}">
@@ -6940,42 +8212,42 @@
 <file path=ppt/theme/theme1.xml><?xml version="1.0" encoding="utf-8"?>
 <a:theme xmlns:a="http://schemas.openxmlformats.org/drawingml/2006/main" name="GradientRiseVTI">
   <a:themeElements>
-    <a:clrScheme name="GradientRise">
+    <a:clrScheme name="Giallo">
       <a:dk1>
         <a:sysClr val="windowText" lastClr="000000"/>
       </a:dk1>
       <a:lt1>
-        <a:srgbClr val="FFFFFF"/>
+        <a:sysClr val="window" lastClr="FFFFFF"/>
       </a:lt1>
       <a:dk2>
-        <a:srgbClr val="3C0F3A"/>
+        <a:srgbClr val="39302A"/>
       </a:dk2>
       <a:lt2>
-        <a:srgbClr val="F1F2F2"/>
+        <a:srgbClr val="E5DEDB"/>
       </a:lt2>
       <a:accent1>
-        <a:srgbClr val="A6025C"/>
+        <a:srgbClr val="FFCA08"/>
       </a:accent1>
       <a:accent2>
-        <a:srgbClr val="92248E"/>
+        <a:srgbClr val="F8931D"/>
       </a:accent2>
       <a:accent3>
-        <a:srgbClr val="DE95C4"/>
+        <a:srgbClr val="CE8D3E"/>
       </a:accent3>
       <a:accent4>
-        <a:srgbClr val="FE4A00"/>
+        <a:srgbClr val="EC7016"/>
       </a:accent4>
       <a:accent5>
-        <a:srgbClr val="DA002F"/>
+        <a:srgbClr val="E64823"/>
       </a:accent5>
       <a:accent6>
-        <a:srgbClr val="FF907A"/>
+        <a:srgbClr val="9C6A6A"/>
       </a:accent6>
       <a:hlink>
-        <a:srgbClr val="CA71E4"/>
+        <a:srgbClr val="2998E3"/>
       </a:hlink>
       <a:folHlink>
-        <a:srgbClr val="E45E49"/>
+        <a:srgbClr val="7F723D"/>
       </a:folHlink>
     </a:clrScheme>
     <a:fontScheme name="Avenir">

</xml_diff>